<commit_message>
added recovery team week 9 report
</commit_message>
<xml_diff>
--- a/recovery-team/week8/Recovery-Team-Week-8.pptx
+++ b/recovery-team/week8/Recovery-Team-Week-8.pptx
@@ -33,7 +33,7 @@
       <p:boldItalic r:id="rId19"/>
     </p:embeddedFont>
     <p:embeddedFont>
-      <p:font typeface="Raleway" panose="020B0604020202020204" pitchFamily="2" charset="0"/>
+      <p:font typeface="Raleway" pitchFamily="2" charset="0"/>
       <p:regular r:id="rId20"/>
       <p:bold r:id="rId21"/>
       <p:italic r:id="rId22"/>
@@ -9972,8 +9972,8 @@
         </p:blipFill>
         <p:spPr>
           <a:xfrm>
-            <a:off x="2422398" y="2348976"/>
-            <a:ext cx="3181448" cy="1881350"/>
+            <a:off x="2405620" y="2298584"/>
+            <a:ext cx="3181448" cy="2233746"/>
           </a:xfrm>
           <a:prstGeom prst="rect">
             <a:avLst/>

</xml_diff>